<commit_message>
RadialMenu for Candidates Finish
</commit_message>
<xml_diff>
--- a/Display/Assets/Resources/RadialMenuDesign.pptx
+++ b/Display/Assets/Resources/RadialMenuDesign.pptx
@@ -5,12 +5,12 @@
     <p:sldMasterId id="2147483660" r:id="rId1"/>
   </p:sldMasterIdLst>
   <p:sldIdLst>
-    <p:sldId id="257" r:id="rId2"/>
+    <p:sldId id="264" r:id="rId2"/>
     <p:sldId id="256" r:id="rId3"/>
     <p:sldId id="260" r:id="rId4"/>
-    <p:sldId id="261" r:id="rId5"/>
-    <p:sldId id="262" r:id="rId6"/>
-    <p:sldId id="263" r:id="rId7"/>
+    <p:sldId id="265" r:id="rId5"/>
+    <p:sldId id="266" r:id="rId6"/>
+    <p:sldId id="267" r:id="rId7"/>
   </p:sldIdLst>
   <p:sldSz cx="10799763" cy="10799763"/>
   <p:notesSz cx="6858000" cy="9144000"/>
@@ -2978,7 +2978,7 @@
       </p:grpSpPr>
       <p:pic>
         <p:nvPicPr>
-          <p:cNvPr id="9" name="图片 8"/>
+          <p:cNvPr id="4" name="图片 3"/>
           <p:cNvPicPr>
             <a:picLocks noChangeAspect="1"/>
           </p:cNvPicPr>
@@ -3019,7 +3019,7 @@
     </p:spTree>
     <p:extLst>
       <p:ext uri="{BB962C8B-B14F-4D97-AF65-F5344CB8AC3E}">
-        <p14:creationId xmlns:p14="http://schemas.microsoft.com/office/powerpoint/2010/main" val="3287292699"/>
+        <p14:creationId xmlns:p14="http://schemas.microsoft.com/office/powerpoint/2010/main" val="2782328927"/>
       </p:ext>
     </p:extLst>
   </p:cSld>
@@ -3112,8 +3112,8 @@
         </p:nvSpPr>
         <p:spPr>
           <a:xfrm>
-            <a:off x="3416209" y="3416209"/>
-            <a:ext cx="3967582" cy="3967582"/>
+            <a:off x="3900234" y="3900234"/>
+            <a:ext cx="2999532" cy="2999532"/>
           </a:xfrm>
           <a:prstGeom prst="ellipse">
             <a:avLst/>
@@ -3163,7 +3163,7 @@
         <p:spPr>
           <a:xfrm flipH="1" flipV="1">
             <a:off x="1708903" y="1708903"/>
-            <a:ext cx="2288345" cy="2288345"/>
+            <a:ext cx="2630602" cy="2630602"/>
           </a:xfrm>
           <a:prstGeom prst="line">
             <a:avLst/>
@@ -3196,8 +3196,8 @@
         </p:nvCxnSpPr>
         <p:spPr>
           <a:xfrm flipV="1">
-            <a:off x="1708903" y="6802752"/>
-            <a:ext cx="2288345" cy="2288345"/>
+            <a:off x="1708903" y="6460495"/>
+            <a:ext cx="2630602" cy="2630602"/>
           </a:xfrm>
           <a:prstGeom prst="line">
             <a:avLst/>
@@ -3230,8 +3230,8 @@
         </p:nvCxnSpPr>
         <p:spPr>
           <a:xfrm flipH="1" flipV="1">
-            <a:off x="6802752" y="6802752"/>
-            <a:ext cx="2288345" cy="2288345"/>
+            <a:off x="6460495" y="6460495"/>
+            <a:ext cx="2630602" cy="2630602"/>
           </a:xfrm>
           <a:prstGeom prst="line">
             <a:avLst/>
@@ -3264,8 +3264,8 @@
         </p:nvCxnSpPr>
         <p:spPr>
           <a:xfrm flipH="1">
-            <a:off x="6802752" y="1708903"/>
-            <a:ext cx="2288345" cy="2288345"/>
+            <a:off x="6460495" y="1708903"/>
+            <a:ext cx="2630602" cy="2630602"/>
           </a:xfrm>
           <a:prstGeom prst="line">
             <a:avLst/>
@@ -3406,7 +3406,7 @@
                   <a:lumOff val="100000"/>
                 </a:schemeClr>
               </a:gs>
-              <a:gs pos="35000">
+              <a:gs pos="27000">
                 <a:schemeClr val="accent3">
                   <a:lumMod val="0"/>
                   <a:lumOff val="100000"/>
@@ -3460,7 +3460,6 @@
         <p:nvCxnSpPr>
           <p:cNvPr id="7" name="直接连接符 6"/>
           <p:cNvCxnSpPr>
-            <a:stCxn id="5" idx="1"/>
             <a:endCxn id="4" idx="1"/>
           </p:cNvCxnSpPr>
           <p:nvPr/>
@@ -3468,7 +3467,7 @@
         <p:spPr>
           <a:xfrm flipH="1" flipV="1">
             <a:off x="1708903" y="1708903"/>
-            <a:ext cx="2288345" cy="2288345"/>
+            <a:ext cx="2614852" cy="2614852"/>
           </a:xfrm>
           <a:prstGeom prst="line">
             <a:avLst/>
@@ -3495,14 +3494,14 @@
           <p:cNvPr id="8" name="直接连接符 7"/>
           <p:cNvCxnSpPr>
             <a:stCxn id="4" idx="3"/>
-            <a:endCxn id="5" idx="3"/>
+            <a:endCxn id="10" idx="3"/>
           </p:cNvCxnSpPr>
           <p:nvPr/>
         </p:nvCxnSpPr>
         <p:spPr>
           <a:xfrm flipV="1">
-            <a:off x="1708903" y="6802752"/>
-            <a:ext cx="2288345" cy="2288345"/>
+            <a:off x="1708903" y="6460495"/>
+            <a:ext cx="2630602" cy="2630602"/>
           </a:xfrm>
           <a:prstGeom prst="line">
             <a:avLst/>
@@ -3529,14 +3528,14 @@
           <p:cNvPr id="11" name="直接连接符 10"/>
           <p:cNvCxnSpPr>
             <a:stCxn id="4" idx="5"/>
-            <a:endCxn id="5" idx="5"/>
+            <a:endCxn id="10" idx="5"/>
           </p:cNvCxnSpPr>
           <p:nvPr/>
         </p:nvCxnSpPr>
         <p:spPr>
           <a:xfrm flipH="1" flipV="1">
-            <a:off x="6802752" y="6802752"/>
-            <a:ext cx="2288345" cy="2288345"/>
+            <a:off x="6460495" y="6460495"/>
+            <a:ext cx="2630602" cy="2630602"/>
           </a:xfrm>
           <a:prstGeom prst="line">
             <a:avLst/>
@@ -3563,14 +3562,14 @@
           <p:cNvPr id="14" name="直接连接符 13"/>
           <p:cNvCxnSpPr>
             <a:stCxn id="4" idx="7"/>
-            <a:endCxn id="5" idx="7"/>
+            <a:endCxn id="10" idx="7"/>
           </p:cNvCxnSpPr>
           <p:nvPr/>
         </p:nvCxnSpPr>
         <p:spPr>
           <a:xfrm flipH="1">
-            <a:off x="6802752" y="1708903"/>
-            <a:ext cx="2288345" cy="2288345"/>
+            <a:off x="6460495" y="1708903"/>
+            <a:ext cx="2630602" cy="2630602"/>
           </a:xfrm>
           <a:prstGeom prst="line">
             <a:avLst/>
@@ -3594,14 +3593,14 @@
       </p:cxnSp>
       <p:sp>
         <p:nvSpPr>
-          <p:cNvPr id="5" name="椭圆 4"/>
+          <p:cNvPr id="10" name="椭圆 9"/>
           <p:cNvSpPr/>
           <p:nvPr/>
         </p:nvSpPr>
         <p:spPr>
           <a:xfrm>
-            <a:off x="3416209" y="3416209"/>
-            <a:ext cx="3967582" cy="3967582"/>
+            <a:off x="3900234" y="3900234"/>
+            <a:ext cx="2999532" cy="2999532"/>
           </a:xfrm>
           <a:prstGeom prst="ellipse">
             <a:avLst/>
@@ -3758,7 +3757,7 @@
                   <a:lumOff val="100000"/>
                 </a:schemeClr>
               </a:gs>
-              <a:gs pos="35000">
+              <a:gs pos="27000">
                 <a:schemeClr val="accent3">
                   <a:lumMod val="0"/>
                   <a:lumOff val="100000"/>
@@ -3812,7 +3811,6 @@
         <p:nvCxnSpPr>
           <p:cNvPr id="7" name="直接连接符 6"/>
           <p:cNvCxnSpPr>
-            <a:stCxn id="5" idx="1"/>
             <a:endCxn id="4" idx="1"/>
           </p:cNvCxnSpPr>
           <p:nvPr/>
@@ -3820,7 +3818,7 @@
         <p:spPr>
           <a:xfrm flipH="1" flipV="1">
             <a:off x="1708903" y="1708903"/>
-            <a:ext cx="2288345" cy="2288345"/>
+            <a:ext cx="2614852" cy="2614852"/>
           </a:xfrm>
           <a:prstGeom prst="line">
             <a:avLst/>
@@ -3847,14 +3845,14 @@
           <p:cNvPr id="8" name="直接连接符 7"/>
           <p:cNvCxnSpPr>
             <a:stCxn id="4" idx="3"/>
-            <a:endCxn id="5" idx="3"/>
+            <a:endCxn id="10" idx="3"/>
           </p:cNvCxnSpPr>
           <p:nvPr/>
         </p:nvCxnSpPr>
         <p:spPr>
           <a:xfrm flipV="1">
-            <a:off x="1708903" y="6802752"/>
-            <a:ext cx="2288345" cy="2288345"/>
+            <a:off x="1708903" y="6460495"/>
+            <a:ext cx="2630602" cy="2630602"/>
           </a:xfrm>
           <a:prstGeom prst="line">
             <a:avLst/>
@@ -3881,14 +3879,14 @@
           <p:cNvPr id="11" name="直接连接符 10"/>
           <p:cNvCxnSpPr>
             <a:stCxn id="4" idx="5"/>
-            <a:endCxn id="5" idx="5"/>
+            <a:endCxn id="10" idx="5"/>
           </p:cNvCxnSpPr>
           <p:nvPr/>
         </p:nvCxnSpPr>
         <p:spPr>
           <a:xfrm flipH="1" flipV="1">
-            <a:off x="6802752" y="6802752"/>
-            <a:ext cx="2288345" cy="2288345"/>
+            <a:off x="6460495" y="6460495"/>
+            <a:ext cx="2630602" cy="2630602"/>
           </a:xfrm>
           <a:prstGeom prst="line">
             <a:avLst/>
@@ -3915,14 +3913,14 @@
           <p:cNvPr id="14" name="直接连接符 13"/>
           <p:cNvCxnSpPr>
             <a:stCxn id="4" idx="7"/>
-            <a:endCxn id="5" idx="7"/>
+            <a:endCxn id="10" idx="7"/>
           </p:cNvCxnSpPr>
           <p:nvPr/>
         </p:nvCxnSpPr>
         <p:spPr>
           <a:xfrm flipH="1">
-            <a:off x="6802752" y="1708903"/>
-            <a:ext cx="2288345" cy="2288345"/>
+            <a:off x="6460495" y="1708903"/>
+            <a:ext cx="2630602" cy="2630602"/>
           </a:xfrm>
           <a:prstGeom prst="line">
             <a:avLst/>
@@ -3946,14 +3944,14 @@
       </p:cxnSp>
       <p:sp>
         <p:nvSpPr>
-          <p:cNvPr id="5" name="椭圆 4"/>
+          <p:cNvPr id="10" name="椭圆 9"/>
           <p:cNvSpPr/>
           <p:nvPr/>
         </p:nvSpPr>
         <p:spPr>
           <a:xfrm>
-            <a:off x="3416209" y="3416209"/>
-            <a:ext cx="3967582" cy="3967582"/>
+            <a:off x="3900234" y="3900234"/>
+            <a:ext cx="2999532" cy="2999532"/>
           </a:xfrm>
           <a:prstGeom prst="ellipse">
             <a:avLst/>
@@ -3994,7 +3992,7 @@
     </p:spTree>
     <p:extLst>
       <p:ext uri="{BB962C8B-B14F-4D97-AF65-F5344CB8AC3E}">
-        <p14:creationId xmlns:p14="http://schemas.microsoft.com/office/powerpoint/2010/main" val="3435403874"/>
+        <p14:creationId xmlns:p14="http://schemas.microsoft.com/office/powerpoint/2010/main" val="3551173969"/>
       </p:ext>
     </p:extLst>
   </p:cSld>
@@ -4093,7 +4091,7 @@
         </p:nvSpPr>
         <p:spPr>
           <a:xfrm rot="2700000">
-            <a:off x="198001" y="223456"/>
+            <a:off x="213241" y="192976"/>
             <a:ext cx="10404000" cy="10404000"/>
           </a:xfrm>
           <a:prstGeom prst="pie">
@@ -4110,7 +4108,7 @@
                   <a:lumOff val="100000"/>
                 </a:schemeClr>
               </a:gs>
-              <a:gs pos="35000">
+              <a:gs pos="27000">
                 <a:schemeClr val="accent3">
                   <a:lumMod val="0"/>
                   <a:lumOff val="100000"/>
@@ -4164,7 +4162,6 @@
         <p:nvCxnSpPr>
           <p:cNvPr id="7" name="直接连接符 6"/>
           <p:cNvCxnSpPr>
-            <a:stCxn id="5" idx="1"/>
             <a:endCxn id="4" idx="1"/>
           </p:cNvCxnSpPr>
           <p:nvPr/>
@@ -4172,7 +4169,7 @@
         <p:spPr>
           <a:xfrm flipH="1" flipV="1">
             <a:off x="1708903" y="1708903"/>
-            <a:ext cx="2288345" cy="2288345"/>
+            <a:ext cx="2614852" cy="2614852"/>
           </a:xfrm>
           <a:prstGeom prst="line">
             <a:avLst/>
@@ -4199,14 +4196,14 @@
           <p:cNvPr id="8" name="直接连接符 7"/>
           <p:cNvCxnSpPr>
             <a:stCxn id="4" idx="3"/>
-            <a:endCxn id="5" idx="3"/>
+            <a:endCxn id="10" idx="3"/>
           </p:cNvCxnSpPr>
           <p:nvPr/>
         </p:nvCxnSpPr>
         <p:spPr>
           <a:xfrm flipV="1">
-            <a:off x="1708903" y="6802752"/>
-            <a:ext cx="2288345" cy="2288345"/>
+            <a:off x="1708903" y="6460495"/>
+            <a:ext cx="2630602" cy="2630602"/>
           </a:xfrm>
           <a:prstGeom prst="line">
             <a:avLst/>
@@ -4233,14 +4230,14 @@
           <p:cNvPr id="11" name="直接连接符 10"/>
           <p:cNvCxnSpPr>
             <a:stCxn id="4" idx="5"/>
-            <a:endCxn id="5" idx="5"/>
+            <a:endCxn id="10" idx="5"/>
           </p:cNvCxnSpPr>
           <p:nvPr/>
         </p:nvCxnSpPr>
         <p:spPr>
           <a:xfrm flipH="1" flipV="1">
-            <a:off x="6802752" y="6802752"/>
-            <a:ext cx="2288345" cy="2288345"/>
+            <a:off x="6460495" y="6460495"/>
+            <a:ext cx="2630602" cy="2630602"/>
           </a:xfrm>
           <a:prstGeom prst="line">
             <a:avLst/>
@@ -4267,14 +4264,14 @@
           <p:cNvPr id="14" name="直接连接符 13"/>
           <p:cNvCxnSpPr>
             <a:stCxn id="4" idx="7"/>
-            <a:endCxn id="5" idx="7"/>
+            <a:endCxn id="10" idx="7"/>
           </p:cNvCxnSpPr>
           <p:nvPr/>
         </p:nvCxnSpPr>
         <p:spPr>
           <a:xfrm flipH="1">
-            <a:off x="6802752" y="1708903"/>
-            <a:ext cx="2288345" cy="2288345"/>
+            <a:off x="6460495" y="1708903"/>
+            <a:ext cx="2630602" cy="2630602"/>
           </a:xfrm>
           <a:prstGeom prst="line">
             <a:avLst/>
@@ -4298,14 +4295,14 @@
       </p:cxnSp>
       <p:sp>
         <p:nvSpPr>
-          <p:cNvPr id="5" name="椭圆 4"/>
+          <p:cNvPr id="10" name="椭圆 9"/>
           <p:cNvSpPr/>
           <p:nvPr/>
         </p:nvSpPr>
         <p:spPr>
           <a:xfrm>
-            <a:off x="3416209" y="3416209"/>
-            <a:ext cx="3967582" cy="3967582"/>
+            <a:off x="3900234" y="3900234"/>
+            <a:ext cx="2999532" cy="2999532"/>
           </a:xfrm>
           <a:prstGeom prst="ellipse">
             <a:avLst/>
@@ -4346,7 +4343,7 @@
     </p:spTree>
     <p:extLst>
       <p:ext uri="{BB962C8B-B14F-4D97-AF65-F5344CB8AC3E}">
-        <p14:creationId xmlns:p14="http://schemas.microsoft.com/office/powerpoint/2010/main" val="2750815882"/>
+        <p14:creationId xmlns:p14="http://schemas.microsoft.com/office/powerpoint/2010/main" val="3244645760"/>
       </p:ext>
     </p:extLst>
   </p:cSld>
@@ -4445,7 +4442,7 @@
         </p:nvSpPr>
         <p:spPr>
           <a:xfrm rot="8100000">
-            <a:off x="198001" y="223456"/>
+            <a:off x="213241" y="208216"/>
             <a:ext cx="10404000" cy="10404000"/>
           </a:xfrm>
           <a:prstGeom prst="pie">
@@ -4462,7 +4459,7 @@
                   <a:lumOff val="100000"/>
                 </a:schemeClr>
               </a:gs>
-              <a:gs pos="35000">
+              <a:gs pos="27000">
                 <a:schemeClr val="accent3">
                   <a:lumMod val="0"/>
                   <a:lumOff val="100000"/>
@@ -4516,7 +4513,6 @@
         <p:nvCxnSpPr>
           <p:cNvPr id="7" name="直接连接符 6"/>
           <p:cNvCxnSpPr>
-            <a:stCxn id="5" idx="1"/>
             <a:endCxn id="4" idx="1"/>
           </p:cNvCxnSpPr>
           <p:nvPr/>
@@ -4524,7 +4520,7 @@
         <p:spPr>
           <a:xfrm flipH="1" flipV="1">
             <a:off x="1708903" y="1708903"/>
-            <a:ext cx="2288345" cy="2288345"/>
+            <a:ext cx="2614852" cy="2614852"/>
           </a:xfrm>
           <a:prstGeom prst="line">
             <a:avLst/>
@@ -4551,14 +4547,14 @@
           <p:cNvPr id="8" name="直接连接符 7"/>
           <p:cNvCxnSpPr>
             <a:stCxn id="4" idx="3"/>
-            <a:endCxn id="5" idx="3"/>
+            <a:endCxn id="10" idx="3"/>
           </p:cNvCxnSpPr>
           <p:nvPr/>
         </p:nvCxnSpPr>
         <p:spPr>
           <a:xfrm flipV="1">
-            <a:off x="1708903" y="6802752"/>
-            <a:ext cx="2288345" cy="2288345"/>
+            <a:off x="1708903" y="6460495"/>
+            <a:ext cx="2630602" cy="2630602"/>
           </a:xfrm>
           <a:prstGeom prst="line">
             <a:avLst/>
@@ -4585,14 +4581,14 @@
           <p:cNvPr id="11" name="直接连接符 10"/>
           <p:cNvCxnSpPr>
             <a:stCxn id="4" idx="5"/>
-            <a:endCxn id="5" idx="5"/>
+            <a:endCxn id="10" idx="5"/>
           </p:cNvCxnSpPr>
           <p:nvPr/>
         </p:nvCxnSpPr>
         <p:spPr>
           <a:xfrm flipH="1" flipV="1">
-            <a:off x="6802752" y="6802752"/>
-            <a:ext cx="2288345" cy="2288345"/>
+            <a:off x="6460495" y="6460495"/>
+            <a:ext cx="2630602" cy="2630602"/>
           </a:xfrm>
           <a:prstGeom prst="line">
             <a:avLst/>
@@ -4619,14 +4615,14 @@
           <p:cNvPr id="14" name="直接连接符 13"/>
           <p:cNvCxnSpPr>
             <a:stCxn id="4" idx="7"/>
-            <a:endCxn id="5" idx="7"/>
+            <a:endCxn id="10" idx="7"/>
           </p:cNvCxnSpPr>
           <p:nvPr/>
         </p:nvCxnSpPr>
         <p:spPr>
           <a:xfrm flipH="1">
-            <a:off x="6802752" y="1708903"/>
-            <a:ext cx="2288345" cy="2288345"/>
+            <a:off x="6460495" y="1708903"/>
+            <a:ext cx="2630602" cy="2630602"/>
           </a:xfrm>
           <a:prstGeom prst="line">
             <a:avLst/>
@@ -4650,14 +4646,14 @@
       </p:cxnSp>
       <p:sp>
         <p:nvSpPr>
-          <p:cNvPr id="5" name="椭圆 4"/>
+          <p:cNvPr id="10" name="椭圆 9"/>
           <p:cNvSpPr/>
           <p:nvPr/>
         </p:nvSpPr>
         <p:spPr>
           <a:xfrm>
-            <a:off x="3416209" y="3416209"/>
-            <a:ext cx="3967582" cy="3967582"/>
+            <a:off x="3900234" y="3900234"/>
+            <a:ext cx="2999532" cy="2999532"/>
           </a:xfrm>
           <a:prstGeom prst="ellipse">
             <a:avLst/>
@@ -4698,7 +4694,7 @@
     </p:spTree>
     <p:extLst>
       <p:ext uri="{BB962C8B-B14F-4D97-AF65-F5344CB8AC3E}">
-        <p14:creationId xmlns:p14="http://schemas.microsoft.com/office/powerpoint/2010/main" val="125365370"/>
+        <p14:creationId xmlns:p14="http://schemas.microsoft.com/office/powerpoint/2010/main" val="743206286"/>
       </p:ext>
     </p:extLst>
   </p:cSld>

</xml_diff>

<commit_message>
Add RadialMenu Cancel Function
</commit_message>
<xml_diff>
--- a/Display/Assets/Resources/RadialMenuDesign.pptx
+++ b/Display/Assets/Resources/RadialMenuDesign.pptx
@@ -9,7 +9,7 @@
     <p:sldId id="256" r:id="rId3"/>
     <p:sldId id="260" r:id="rId4"/>
     <p:sldId id="265" r:id="rId5"/>
-    <p:sldId id="266" r:id="rId6"/>
+    <p:sldId id="268" r:id="rId6"/>
     <p:sldId id="267" r:id="rId7"/>
   </p:sldIdLst>
   <p:sldSz cx="10799763" cy="10799763"/>
@@ -2978,7 +2978,7 @@
       </p:grpSpPr>
       <p:pic>
         <p:nvPicPr>
-          <p:cNvPr id="4" name="图片 3"/>
+          <p:cNvPr id="13" name="图片 12"/>
           <p:cNvPicPr>
             <a:picLocks noChangeAspect="1"/>
           </p:cNvPicPr>
@@ -4091,7 +4091,7 @@
         </p:nvSpPr>
         <p:spPr>
           <a:xfrm rot="2700000">
-            <a:off x="213241" y="192976"/>
+            <a:off x="213241" y="208216"/>
             <a:ext cx="10404000" cy="10404000"/>
           </a:xfrm>
           <a:prstGeom prst="pie">
@@ -4343,7 +4343,7 @@
     </p:spTree>
     <p:extLst>
       <p:ext uri="{BB962C8B-B14F-4D97-AF65-F5344CB8AC3E}">
-        <p14:creationId xmlns:p14="http://schemas.microsoft.com/office/powerpoint/2010/main" val="3244645760"/>
+        <p14:creationId xmlns:p14="http://schemas.microsoft.com/office/powerpoint/2010/main" val="460138564"/>
       </p:ext>
     </p:extLst>
   </p:cSld>

</xml_diff>

<commit_message>
Display: Fix Block ID
</commit_message>
<xml_diff>
--- a/Display/Assets/Resources/RadialMenuDesign.pptx
+++ b/Display/Assets/Resources/RadialMenuDesign.pptx
@@ -5,11 +5,12 @@
     <p:sldMasterId id="2147483660" r:id="rId1"/>
   </p:sldMasterIdLst>
   <p:sldIdLst>
-    <p:sldId id="272" r:id="rId2"/>
-    <p:sldId id="260" r:id="rId3"/>
-    <p:sldId id="269" r:id="rId4"/>
-    <p:sldId id="270" r:id="rId5"/>
-    <p:sldId id="271" r:id="rId6"/>
+    <p:sldId id="273" r:id="rId2"/>
+    <p:sldId id="272" r:id="rId3"/>
+    <p:sldId id="260" r:id="rId4"/>
+    <p:sldId id="269" r:id="rId5"/>
+    <p:sldId id="270" r:id="rId6"/>
+    <p:sldId id="271" r:id="rId7"/>
   </p:sldIdLst>
   <p:sldSz cx="10799763" cy="10799763"/>
   <p:notesSz cx="6858000" cy="9144000"/>
@@ -2961,14 +2962,6 @@
 <file path=ppt/slides/slide1.xml><?xml version="1.0" encoding="utf-8"?>
 <p:sld xmlns:a="http://schemas.openxmlformats.org/drawingml/2006/main" xmlns:r="http://schemas.openxmlformats.org/officeDocument/2006/relationships" xmlns:p="http://schemas.openxmlformats.org/presentationml/2006/main">
   <p:cSld>
-    <p:bg>
-      <p:bgPr>
-        <a:solidFill>
-          <a:srgbClr val="9DC3E6"/>
-        </a:solidFill>
-        <a:effectLst/>
-      </p:bgPr>
-    </p:bg>
     <p:spTree>
       <p:nvGrpSpPr>
         <p:cNvPr id="1" name=""/>
@@ -2983,240 +2976,50 @@
           <a:chExt cx="0" cy="0"/>
         </a:xfrm>
       </p:grpSpPr>
-      <p:sp>
-        <p:nvSpPr>
-          <p:cNvPr id="4" name="椭圆 3"/>
-          <p:cNvSpPr/>
+      <p:pic>
+        <p:nvPicPr>
+          <p:cNvPr id="8" name="图片 7"/>
+          <p:cNvPicPr>
+            <a:picLocks noChangeAspect="1"/>
+          </p:cNvPicPr>
           <p:nvPr/>
-        </p:nvSpPr>
+        </p:nvPicPr>
+        <p:blipFill>
+          <a:blip r:embed="rId2">
+            <a:clrChange>
+              <a:clrFrom>
+                <a:srgbClr val="9DC3E6"/>
+              </a:clrFrom>
+              <a:clrTo>
+                <a:srgbClr val="9DC3E6">
+                  <a:alpha val="0"/>
+                </a:srgbClr>
+              </a:clrTo>
+            </a:clrChange>
+            <a:extLst>
+              <a:ext uri="{28A0092B-C50C-407E-A947-70E740481C1C}">
+                <a14:useLocalDpi xmlns:a14="http://schemas.microsoft.com/office/drawing/2010/main" val="0"/>
+              </a:ext>
+            </a:extLst>
+          </a:blip>
+          <a:stretch>
+            <a:fillRect/>
+          </a:stretch>
+        </p:blipFill>
         <p:spPr>
           <a:xfrm>
-            <a:off x="180000" y="180000"/>
-            <a:ext cx="10440000" cy="10440000"/>
-          </a:xfrm>
-          <a:prstGeom prst="ellipse">
+            <a:off x="0" y="0"/>
+            <a:ext cx="10799763" cy="10799763"/>
+          </a:xfrm>
+          <a:prstGeom prst="rect">
             <a:avLst/>
           </a:prstGeom>
-          <a:solidFill>
-            <a:schemeClr val="bg1"/>
-          </a:solidFill>
-          <a:ln w="76200"/>
-        </p:spPr>
-        <p:style>
-          <a:lnRef idx="2">
-            <a:schemeClr val="dk1"/>
-          </a:lnRef>
-          <a:fillRef idx="1">
-            <a:schemeClr val="lt1"/>
-          </a:fillRef>
-          <a:effectRef idx="0">
-            <a:schemeClr val="dk1"/>
-          </a:effectRef>
-          <a:fontRef idx="minor">
-            <a:schemeClr val="dk1"/>
-          </a:fontRef>
-        </p:style>
-        <p:txBody>
-          <a:bodyPr rot="0" spcFirstLastPara="0" vertOverflow="overflow" horzOverflow="overflow" vert="horz" wrap="square" lIns="143997" tIns="71998" rIns="143997" bIns="71998" numCol="1" spcCol="0" rtlCol="0" fromWordArt="0" anchor="ctr" anchorCtr="0" forceAA="0" compatLnSpc="1">
-            <a:prstTxWarp prst="textNoShape">
-              <a:avLst/>
-            </a:prstTxWarp>
-            <a:noAutofit/>
-          </a:bodyPr>
-          <a:lstStyle/>
-          <a:p>
-            <a:pPr algn="ctr"/>
-            <a:endParaRPr lang="zh-CN" altLang="en-US" sz="2835"/>
-          </a:p>
-        </p:txBody>
-      </p:sp>
-      <p:cxnSp>
-        <p:nvCxnSpPr>
-          <p:cNvPr id="7" name="直接连接符 6"/>
-          <p:cNvCxnSpPr>
-            <a:stCxn id="10" idx="1"/>
-            <a:endCxn id="4" idx="1"/>
-          </p:cNvCxnSpPr>
-          <p:nvPr/>
-        </p:nvCxnSpPr>
-        <p:spPr>
-          <a:xfrm flipH="1" flipV="1">
-            <a:off x="1708903" y="1708903"/>
-            <a:ext cx="2881618" cy="2886471"/>
-          </a:xfrm>
-          <a:prstGeom prst="line">
-            <a:avLst/>
-          </a:prstGeom>
-          <a:ln w="57150"/>
-        </p:spPr>
-        <p:style>
-          <a:lnRef idx="3">
-            <a:schemeClr val="dk1"/>
-          </a:lnRef>
-          <a:fillRef idx="0">
-            <a:schemeClr val="dk1"/>
-          </a:fillRef>
-          <a:effectRef idx="2">
-            <a:schemeClr val="dk1"/>
-          </a:effectRef>
-          <a:fontRef idx="minor">
-            <a:schemeClr val="tx1"/>
-          </a:fontRef>
-        </p:style>
-      </p:cxnSp>
-      <p:cxnSp>
-        <p:nvCxnSpPr>
-          <p:cNvPr id="8" name="直接连接符 7"/>
-          <p:cNvCxnSpPr>
-            <a:stCxn id="4" idx="3"/>
-            <a:endCxn id="10" idx="3"/>
-          </p:cNvCxnSpPr>
-          <p:nvPr/>
-        </p:nvCxnSpPr>
-        <p:spPr>
-          <a:xfrm flipV="1">
-            <a:off x="1708903" y="6214331"/>
-            <a:ext cx="2881618" cy="2876766"/>
-          </a:xfrm>
-          <a:prstGeom prst="line">
-            <a:avLst/>
-          </a:prstGeom>
-          <a:ln w="57150"/>
-        </p:spPr>
-        <p:style>
-          <a:lnRef idx="3">
-            <a:schemeClr val="dk1"/>
-          </a:lnRef>
-          <a:fillRef idx="0">
-            <a:schemeClr val="dk1"/>
-          </a:fillRef>
-          <a:effectRef idx="2">
-            <a:schemeClr val="dk1"/>
-          </a:effectRef>
-          <a:fontRef idx="minor">
-            <a:schemeClr val="tx1"/>
-          </a:fontRef>
-        </p:style>
-      </p:cxnSp>
-      <p:cxnSp>
-        <p:nvCxnSpPr>
-          <p:cNvPr id="11" name="直接连接符 10"/>
-          <p:cNvCxnSpPr>
-            <a:stCxn id="4" idx="5"/>
-            <a:endCxn id="10" idx="5"/>
-          </p:cNvCxnSpPr>
-          <p:nvPr/>
-        </p:nvCxnSpPr>
-        <p:spPr>
-          <a:xfrm flipH="1" flipV="1">
-            <a:off x="6209478" y="6214331"/>
-            <a:ext cx="2881619" cy="2876766"/>
-          </a:xfrm>
-          <a:prstGeom prst="line">
-            <a:avLst/>
-          </a:prstGeom>
-          <a:ln w="57150"/>
-        </p:spPr>
-        <p:style>
-          <a:lnRef idx="3">
-            <a:schemeClr val="dk1"/>
-          </a:lnRef>
-          <a:fillRef idx="0">
-            <a:schemeClr val="dk1"/>
-          </a:fillRef>
-          <a:effectRef idx="2">
-            <a:schemeClr val="dk1"/>
-          </a:effectRef>
-          <a:fontRef idx="minor">
-            <a:schemeClr val="tx1"/>
-          </a:fontRef>
-        </p:style>
-      </p:cxnSp>
-      <p:cxnSp>
-        <p:nvCxnSpPr>
-          <p:cNvPr id="14" name="直接连接符 13"/>
-          <p:cNvCxnSpPr>
-            <a:stCxn id="4" idx="7"/>
-            <a:endCxn id="10" idx="7"/>
-          </p:cNvCxnSpPr>
-          <p:nvPr/>
-        </p:nvCxnSpPr>
-        <p:spPr>
-          <a:xfrm flipH="1">
-            <a:off x="6209478" y="1708903"/>
-            <a:ext cx="2881619" cy="2886471"/>
-          </a:xfrm>
-          <a:prstGeom prst="line">
-            <a:avLst/>
-          </a:prstGeom>
-          <a:ln w="57150"/>
-        </p:spPr>
-        <p:style>
-          <a:lnRef idx="3">
-            <a:schemeClr val="dk1"/>
-          </a:lnRef>
-          <a:fillRef idx="0">
-            <a:schemeClr val="dk1"/>
-          </a:fillRef>
-          <a:effectRef idx="2">
-            <a:schemeClr val="dk1"/>
-          </a:effectRef>
-          <a:fontRef idx="minor">
-            <a:schemeClr val="tx1"/>
-          </a:fontRef>
-        </p:style>
-      </p:cxnSp>
-      <p:sp>
-        <p:nvSpPr>
-          <p:cNvPr id="10" name="椭圆 9"/>
-          <p:cNvSpPr/>
-          <p:nvPr/>
-        </p:nvSpPr>
-        <p:spPr>
-          <a:xfrm>
-            <a:off x="4255224" y="4260077"/>
-            <a:ext cx="2289551" cy="2289551"/>
-          </a:xfrm>
-          <a:prstGeom prst="ellipse">
-            <a:avLst/>
-          </a:prstGeom>
-          <a:solidFill>
-            <a:srgbClr val="9DC3E6"/>
-          </a:solidFill>
-          <a:ln w="57150"/>
-        </p:spPr>
-        <p:style>
-          <a:lnRef idx="2">
-            <a:schemeClr val="dk1"/>
-          </a:lnRef>
-          <a:fillRef idx="1">
-            <a:schemeClr val="lt1"/>
-          </a:fillRef>
-          <a:effectRef idx="0">
-            <a:schemeClr val="dk1"/>
-          </a:effectRef>
-          <a:fontRef idx="minor">
-            <a:schemeClr val="dk1"/>
-          </a:fontRef>
-        </p:style>
-        <p:txBody>
-          <a:bodyPr rot="0" spcFirstLastPara="0" vertOverflow="overflow" horzOverflow="overflow" vert="horz" wrap="square" lIns="143997" tIns="71998" rIns="143997" bIns="71998" numCol="1" spcCol="0" rtlCol="0" fromWordArt="0" anchor="ctr" anchorCtr="0" forceAA="0" compatLnSpc="1">
-            <a:prstTxWarp prst="textNoShape">
-              <a:avLst/>
-            </a:prstTxWarp>
-            <a:noAutofit/>
-          </a:bodyPr>
-          <a:lstStyle/>
-          <a:p>
-            <a:pPr algn="ctr"/>
-            <a:endParaRPr lang="zh-CN" altLang="en-US" sz="2835"/>
-          </a:p>
-        </p:txBody>
-      </p:sp>
+        </p:spPr>
+      </p:pic>
     </p:spTree>
     <p:extLst>
       <p:ext uri="{BB962C8B-B14F-4D97-AF65-F5344CB8AC3E}">
-        <p14:creationId xmlns:p14="http://schemas.microsoft.com/office/powerpoint/2010/main" val="698994882"/>
+        <p14:creationId xmlns:p14="http://schemas.microsoft.com/office/powerpoint/2010/main" val="476207006"/>
       </p:ext>
     </p:extLst>
   </p:cSld>
@@ -3305,83 +3108,6 @@
           </a:p>
         </p:txBody>
       </p:sp>
-      <p:sp>
-        <p:nvSpPr>
-          <p:cNvPr id="9" name="饼形 8"/>
-          <p:cNvSpPr>
-            <a:spLocks noChangeAspect="1"/>
-          </p:cNvSpPr>
-          <p:nvPr/>
-        </p:nvSpPr>
-        <p:spPr>
-          <a:xfrm rot="13500000">
-            <a:off x="178677" y="226773"/>
-            <a:ext cx="10440000" cy="10440000"/>
-          </a:xfrm>
-          <a:prstGeom prst="pie">
-            <a:avLst>
-              <a:gd name="adj1" fmla="val 6536"/>
-              <a:gd name="adj2" fmla="val 5385412"/>
-            </a:avLst>
-          </a:prstGeom>
-          <a:gradFill flip="none" rotWithShape="1">
-            <a:gsLst>
-              <a:gs pos="0">
-                <a:schemeClr val="accent3">
-                  <a:lumMod val="0"/>
-                  <a:lumOff val="100000"/>
-                </a:schemeClr>
-              </a:gs>
-              <a:gs pos="27000">
-                <a:schemeClr val="accent3">
-                  <a:lumMod val="0"/>
-                  <a:lumOff val="100000"/>
-                </a:schemeClr>
-              </a:gs>
-              <a:gs pos="100000">
-                <a:schemeClr val="accent3">
-                  <a:lumMod val="100000"/>
-                </a:schemeClr>
-              </a:gs>
-            </a:gsLst>
-            <a:path path="circle">
-              <a:fillToRect r="100000" b="100000"/>
-            </a:path>
-            <a:tileRect l="-100000" t="-100000"/>
-          </a:gradFill>
-          <a:ln>
-            <a:noFill/>
-          </a:ln>
-        </p:spPr>
-        <p:style>
-          <a:lnRef idx="2">
-            <a:schemeClr val="accent1">
-              <a:shade val="50000"/>
-            </a:schemeClr>
-          </a:lnRef>
-          <a:fillRef idx="1">
-            <a:schemeClr val="accent1"/>
-          </a:fillRef>
-          <a:effectRef idx="0">
-            <a:schemeClr val="accent1"/>
-          </a:effectRef>
-          <a:fontRef idx="minor">
-            <a:schemeClr val="lt1"/>
-          </a:fontRef>
-        </p:style>
-        <p:txBody>
-          <a:bodyPr rtlCol="0" anchor="ctr"/>
-          <a:lstStyle/>
-          <a:p>
-            <a:pPr algn="ctr"/>
-            <a:endParaRPr lang="zh-CN" altLang="en-US">
-              <a:solidFill>
-                <a:schemeClr val="tx1"/>
-              </a:solidFill>
-            </a:endParaRPr>
-          </a:p>
-        </p:txBody>
-      </p:sp>
       <p:cxnSp>
         <p:nvCxnSpPr>
           <p:cNvPr id="7" name="直接连接符 6"/>
@@ -3568,7 +3294,7 @@
     </p:spTree>
     <p:extLst>
       <p:ext uri="{BB962C8B-B14F-4D97-AF65-F5344CB8AC3E}">
-        <p14:creationId xmlns:p14="http://schemas.microsoft.com/office/powerpoint/2010/main" val="2504423096"/>
+        <p14:creationId xmlns:p14="http://schemas.microsoft.com/office/powerpoint/2010/main" val="698994882"/>
       </p:ext>
     </p:extLst>
   </p:cSld>
@@ -3666,8 +3392,8 @@
           <p:nvPr/>
         </p:nvSpPr>
         <p:spPr>
-          <a:xfrm rot="8100000">
-            <a:off x="234949" y="184569"/>
+          <a:xfrm rot="13500000">
+            <a:off x="178677" y="226773"/>
             <a:ext cx="10440000" cy="10440000"/>
           </a:xfrm>
           <a:prstGeom prst="pie">
@@ -3920,7 +3646,7 @@
     </p:spTree>
     <p:extLst>
       <p:ext uri="{BB962C8B-B14F-4D97-AF65-F5344CB8AC3E}">
-        <p14:creationId xmlns:p14="http://schemas.microsoft.com/office/powerpoint/2010/main" val="1684460243"/>
+        <p14:creationId xmlns:p14="http://schemas.microsoft.com/office/powerpoint/2010/main" val="2504423096"/>
       </p:ext>
     </p:extLst>
   </p:cSld>
@@ -4018,8 +3744,8 @@
           <p:nvPr/>
         </p:nvSpPr>
         <p:spPr>
-          <a:xfrm rot="2700000">
-            <a:off x="206813" y="142365"/>
+          <a:xfrm rot="8100000">
+            <a:off x="234949" y="184569"/>
             <a:ext cx="10440000" cy="10440000"/>
           </a:xfrm>
           <a:prstGeom prst="pie">
@@ -4272,6 +3998,358 @@
     </p:spTree>
     <p:extLst>
       <p:ext uri="{BB962C8B-B14F-4D97-AF65-F5344CB8AC3E}">
+        <p14:creationId xmlns:p14="http://schemas.microsoft.com/office/powerpoint/2010/main" val="1684460243"/>
+      </p:ext>
+    </p:extLst>
+  </p:cSld>
+  <p:clrMapOvr>
+    <a:masterClrMapping/>
+  </p:clrMapOvr>
+  <p:timing>
+    <p:tnLst>
+      <p:par>
+        <p:cTn id="1" dur="indefinite" restart="never" nodeType="tmRoot"/>
+      </p:par>
+    </p:tnLst>
+  </p:timing>
+</p:sld>
+</file>
+
+<file path=ppt/slides/slide5.xml><?xml version="1.0" encoding="utf-8"?>
+<p:sld xmlns:a="http://schemas.openxmlformats.org/drawingml/2006/main" xmlns:r="http://schemas.openxmlformats.org/officeDocument/2006/relationships" xmlns:p="http://schemas.openxmlformats.org/presentationml/2006/main">
+  <p:cSld>
+    <p:bg>
+      <p:bgPr>
+        <a:solidFill>
+          <a:srgbClr val="9DC3E6"/>
+        </a:solidFill>
+        <a:effectLst/>
+      </p:bgPr>
+    </p:bg>
+    <p:spTree>
+      <p:nvGrpSpPr>
+        <p:cNvPr id="1" name=""/>
+        <p:cNvGrpSpPr/>
+        <p:nvPr/>
+      </p:nvGrpSpPr>
+      <p:grpSpPr>
+        <a:xfrm>
+          <a:off x="0" y="0"/>
+          <a:ext cx="0" cy="0"/>
+          <a:chOff x="0" y="0"/>
+          <a:chExt cx="0" cy="0"/>
+        </a:xfrm>
+      </p:grpSpPr>
+      <p:sp>
+        <p:nvSpPr>
+          <p:cNvPr id="4" name="椭圆 3"/>
+          <p:cNvSpPr/>
+          <p:nvPr/>
+        </p:nvSpPr>
+        <p:spPr>
+          <a:xfrm>
+            <a:off x="180000" y="180000"/>
+            <a:ext cx="10440000" cy="10440000"/>
+          </a:xfrm>
+          <a:prstGeom prst="ellipse">
+            <a:avLst/>
+          </a:prstGeom>
+          <a:solidFill>
+            <a:schemeClr val="bg1"/>
+          </a:solidFill>
+          <a:ln w="76200"/>
+        </p:spPr>
+        <p:style>
+          <a:lnRef idx="2">
+            <a:schemeClr val="dk1"/>
+          </a:lnRef>
+          <a:fillRef idx="1">
+            <a:schemeClr val="lt1"/>
+          </a:fillRef>
+          <a:effectRef idx="0">
+            <a:schemeClr val="dk1"/>
+          </a:effectRef>
+          <a:fontRef idx="minor">
+            <a:schemeClr val="dk1"/>
+          </a:fontRef>
+        </p:style>
+        <p:txBody>
+          <a:bodyPr rot="0" spcFirstLastPara="0" vertOverflow="overflow" horzOverflow="overflow" vert="horz" wrap="square" lIns="143997" tIns="71998" rIns="143997" bIns="71998" numCol="1" spcCol="0" rtlCol="0" fromWordArt="0" anchor="ctr" anchorCtr="0" forceAA="0" compatLnSpc="1">
+            <a:prstTxWarp prst="textNoShape">
+              <a:avLst/>
+            </a:prstTxWarp>
+            <a:noAutofit/>
+          </a:bodyPr>
+          <a:lstStyle/>
+          <a:p>
+            <a:pPr algn="ctr"/>
+            <a:endParaRPr lang="zh-CN" altLang="en-US" sz="2835"/>
+          </a:p>
+        </p:txBody>
+      </p:sp>
+      <p:sp>
+        <p:nvSpPr>
+          <p:cNvPr id="9" name="饼形 8"/>
+          <p:cNvSpPr>
+            <a:spLocks noChangeAspect="1"/>
+          </p:cNvSpPr>
+          <p:nvPr/>
+        </p:nvSpPr>
+        <p:spPr>
+          <a:xfrm rot="2700000">
+            <a:off x="206813" y="142365"/>
+            <a:ext cx="10440000" cy="10440000"/>
+          </a:xfrm>
+          <a:prstGeom prst="pie">
+            <a:avLst>
+              <a:gd name="adj1" fmla="val 6536"/>
+              <a:gd name="adj2" fmla="val 5385412"/>
+            </a:avLst>
+          </a:prstGeom>
+          <a:gradFill flip="none" rotWithShape="1">
+            <a:gsLst>
+              <a:gs pos="0">
+                <a:schemeClr val="accent3">
+                  <a:lumMod val="0"/>
+                  <a:lumOff val="100000"/>
+                </a:schemeClr>
+              </a:gs>
+              <a:gs pos="27000">
+                <a:schemeClr val="accent3">
+                  <a:lumMod val="0"/>
+                  <a:lumOff val="100000"/>
+                </a:schemeClr>
+              </a:gs>
+              <a:gs pos="100000">
+                <a:schemeClr val="accent3">
+                  <a:lumMod val="100000"/>
+                </a:schemeClr>
+              </a:gs>
+            </a:gsLst>
+            <a:path path="circle">
+              <a:fillToRect r="100000" b="100000"/>
+            </a:path>
+            <a:tileRect l="-100000" t="-100000"/>
+          </a:gradFill>
+          <a:ln>
+            <a:noFill/>
+          </a:ln>
+        </p:spPr>
+        <p:style>
+          <a:lnRef idx="2">
+            <a:schemeClr val="accent1">
+              <a:shade val="50000"/>
+            </a:schemeClr>
+          </a:lnRef>
+          <a:fillRef idx="1">
+            <a:schemeClr val="accent1"/>
+          </a:fillRef>
+          <a:effectRef idx="0">
+            <a:schemeClr val="accent1"/>
+          </a:effectRef>
+          <a:fontRef idx="minor">
+            <a:schemeClr val="lt1"/>
+          </a:fontRef>
+        </p:style>
+        <p:txBody>
+          <a:bodyPr rtlCol="0" anchor="ctr"/>
+          <a:lstStyle/>
+          <a:p>
+            <a:pPr algn="ctr"/>
+            <a:endParaRPr lang="zh-CN" altLang="en-US">
+              <a:solidFill>
+                <a:schemeClr val="tx1"/>
+              </a:solidFill>
+            </a:endParaRPr>
+          </a:p>
+        </p:txBody>
+      </p:sp>
+      <p:cxnSp>
+        <p:nvCxnSpPr>
+          <p:cNvPr id="7" name="直接连接符 6"/>
+          <p:cNvCxnSpPr>
+            <a:stCxn id="10" idx="1"/>
+            <a:endCxn id="4" idx="1"/>
+          </p:cNvCxnSpPr>
+          <p:nvPr/>
+        </p:nvCxnSpPr>
+        <p:spPr>
+          <a:xfrm flipH="1" flipV="1">
+            <a:off x="1708903" y="1708903"/>
+            <a:ext cx="2881618" cy="2886471"/>
+          </a:xfrm>
+          <a:prstGeom prst="line">
+            <a:avLst/>
+          </a:prstGeom>
+          <a:ln w="57150"/>
+        </p:spPr>
+        <p:style>
+          <a:lnRef idx="3">
+            <a:schemeClr val="dk1"/>
+          </a:lnRef>
+          <a:fillRef idx="0">
+            <a:schemeClr val="dk1"/>
+          </a:fillRef>
+          <a:effectRef idx="2">
+            <a:schemeClr val="dk1"/>
+          </a:effectRef>
+          <a:fontRef idx="minor">
+            <a:schemeClr val="tx1"/>
+          </a:fontRef>
+        </p:style>
+      </p:cxnSp>
+      <p:cxnSp>
+        <p:nvCxnSpPr>
+          <p:cNvPr id="8" name="直接连接符 7"/>
+          <p:cNvCxnSpPr>
+            <a:stCxn id="4" idx="3"/>
+            <a:endCxn id="10" idx="3"/>
+          </p:cNvCxnSpPr>
+          <p:nvPr/>
+        </p:nvCxnSpPr>
+        <p:spPr>
+          <a:xfrm flipV="1">
+            <a:off x="1708903" y="6214331"/>
+            <a:ext cx="2881618" cy="2876766"/>
+          </a:xfrm>
+          <a:prstGeom prst="line">
+            <a:avLst/>
+          </a:prstGeom>
+          <a:ln w="57150"/>
+        </p:spPr>
+        <p:style>
+          <a:lnRef idx="3">
+            <a:schemeClr val="dk1"/>
+          </a:lnRef>
+          <a:fillRef idx="0">
+            <a:schemeClr val="dk1"/>
+          </a:fillRef>
+          <a:effectRef idx="2">
+            <a:schemeClr val="dk1"/>
+          </a:effectRef>
+          <a:fontRef idx="minor">
+            <a:schemeClr val="tx1"/>
+          </a:fontRef>
+        </p:style>
+      </p:cxnSp>
+      <p:cxnSp>
+        <p:nvCxnSpPr>
+          <p:cNvPr id="11" name="直接连接符 10"/>
+          <p:cNvCxnSpPr>
+            <a:stCxn id="4" idx="5"/>
+            <a:endCxn id="10" idx="5"/>
+          </p:cNvCxnSpPr>
+          <p:nvPr/>
+        </p:nvCxnSpPr>
+        <p:spPr>
+          <a:xfrm flipH="1" flipV="1">
+            <a:off x="6209478" y="6214331"/>
+            <a:ext cx="2881619" cy="2876766"/>
+          </a:xfrm>
+          <a:prstGeom prst="line">
+            <a:avLst/>
+          </a:prstGeom>
+          <a:ln w="57150"/>
+        </p:spPr>
+        <p:style>
+          <a:lnRef idx="3">
+            <a:schemeClr val="dk1"/>
+          </a:lnRef>
+          <a:fillRef idx="0">
+            <a:schemeClr val="dk1"/>
+          </a:fillRef>
+          <a:effectRef idx="2">
+            <a:schemeClr val="dk1"/>
+          </a:effectRef>
+          <a:fontRef idx="minor">
+            <a:schemeClr val="tx1"/>
+          </a:fontRef>
+        </p:style>
+      </p:cxnSp>
+      <p:cxnSp>
+        <p:nvCxnSpPr>
+          <p:cNvPr id="14" name="直接连接符 13"/>
+          <p:cNvCxnSpPr>
+            <a:stCxn id="4" idx="7"/>
+            <a:endCxn id="10" idx="7"/>
+          </p:cNvCxnSpPr>
+          <p:nvPr/>
+        </p:nvCxnSpPr>
+        <p:spPr>
+          <a:xfrm flipH="1">
+            <a:off x="6209478" y="1708903"/>
+            <a:ext cx="2881619" cy="2886471"/>
+          </a:xfrm>
+          <a:prstGeom prst="line">
+            <a:avLst/>
+          </a:prstGeom>
+          <a:ln w="57150"/>
+        </p:spPr>
+        <p:style>
+          <a:lnRef idx="3">
+            <a:schemeClr val="dk1"/>
+          </a:lnRef>
+          <a:fillRef idx="0">
+            <a:schemeClr val="dk1"/>
+          </a:fillRef>
+          <a:effectRef idx="2">
+            <a:schemeClr val="dk1"/>
+          </a:effectRef>
+          <a:fontRef idx="minor">
+            <a:schemeClr val="tx1"/>
+          </a:fontRef>
+        </p:style>
+      </p:cxnSp>
+      <p:sp>
+        <p:nvSpPr>
+          <p:cNvPr id="10" name="椭圆 9"/>
+          <p:cNvSpPr/>
+          <p:nvPr/>
+        </p:nvSpPr>
+        <p:spPr>
+          <a:xfrm>
+            <a:off x="4255224" y="4260077"/>
+            <a:ext cx="2289551" cy="2289551"/>
+          </a:xfrm>
+          <a:prstGeom prst="ellipse">
+            <a:avLst/>
+          </a:prstGeom>
+          <a:solidFill>
+            <a:srgbClr val="9DC3E6"/>
+          </a:solidFill>
+          <a:ln w="57150"/>
+        </p:spPr>
+        <p:style>
+          <a:lnRef idx="2">
+            <a:schemeClr val="dk1"/>
+          </a:lnRef>
+          <a:fillRef idx="1">
+            <a:schemeClr val="lt1"/>
+          </a:fillRef>
+          <a:effectRef idx="0">
+            <a:schemeClr val="dk1"/>
+          </a:effectRef>
+          <a:fontRef idx="minor">
+            <a:schemeClr val="dk1"/>
+          </a:fontRef>
+        </p:style>
+        <p:txBody>
+          <a:bodyPr rot="0" spcFirstLastPara="0" vertOverflow="overflow" horzOverflow="overflow" vert="horz" wrap="square" lIns="143997" tIns="71998" rIns="143997" bIns="71998" numCol="1" spcCol="0" rtlCol="0" fromWordArt="0" anchor="ctr" anchorCtr="0" forceAA="0" compatLnSpc="1">
+            <a:prstTxWarp prst="textNoShape">
+              <a:avLst/>
+            </a:prstTxWarp>
+            <a:noAutofit/>
+          </a:bodyPr>
+          <a:lstStyle/>
+          <a:p>
+            <a:pPr algn="ctr"/>
+            <a:endParaRPr lang="zh-CN" altLang="en-US" sz="2835"/>
+          </a:p>
+        </p:txBody>
+      </p:sp>
+    </p:spTree>
+    <p:extLst>
+      <p:ext uri="{BB962C8B-B14F-4D97-AF65-F5344CB8AC3E}">
         <p14:creationId xmlns:p14="http://schemas.microsoft.com/office/powerpoint/2010/main" val="1275554665"/>
       </p:ext>
     </p:extLst>
@@ -4289,7 +4367,7 @@
 </p:sld>
 </file>
 
-<file path=ppt/slides/slide5.xml><?xml version="1.0" encoding="utf-8"?>
+<file path=ppt/slides/slide6.xml><?xml version="1.0" encoding="utf-8"?>
 <p:sld xmlns:a="http://schemas.openxmlformats.org/drawingml/2006/main" xmlns:r="http://schemas.openxmlformats.org/officeDocument/2006/relationships" xmlns:p="http://schemas.openxmlformats.org/presentationml/2006/main">
   <p:cSld>
     <p:bg>

</xml_diff>